<commit_message>
updated presentation and converted to pdf
</commit_message>
<xml_diff>
--- a/03_Exposé/Exposé Vortrag.pptx
+++ b/03_Exposé/Exposé Vortrag.pptx
@@ -356,7 +356,7 @@
             <a:fld id="{5586B75A-687E-405C-8A0B-8D00578BA2C3}" type="datetimeFigureOut">
               <a:rPr lang="en-US" dirty="0"/>
               <a:pPr/>
-              <a:t>6/24/2021</a:t>
+              <a:t>6/28/2021</a:t>
             </a:fld>
             <a:endParaRPr lang="en-US" dirty="0"/>
           </a:p>
@@ -523,7 +523,7 @@
             <a:fld id="{5586B75A-687E-405C-8A0B-8D00578BA2C3}" type="datetimeFigureOut">
               <a:rPr lang="en-US" dirty="0"/>
               <a:pPr/>
-              <a:t>6/24/2021</a:t>
+              <a:t>6/28/2021</a:t>
             </a:fld>
             <a:endParaRPr lang="en-US" dirty="0"/>
           </a:p>
@@ -700,7 +700,7 @@
             <a:fld id="{5586B75A-687E-405C-8A0B-8D00578BA2C3}" type="datetimeFigureOut">
               <a:rPr lang="en-US" dirty="0"/>
               <a:pPr/>
-              <a:t>6/24/2021</a:t>
+              <a:t>6/28/2021</a:t>
             </a:fld>
             <a:endParaRPr lang="en-US" dirty="0"/>
           </a:p>
@@ -867,7 +867,7 @@
             <a:fld id="{5586B75A-687E-405C-8A0B-8D00578BA2C3}" type="datetimeFigureOut">
               <a:rPr lang="en-US" dirty="0"/>
               <a:pPr/>
-              <a:t>6/24/2021</a:t>
+              <a:t>6/28/2021</a:t>
             </a:fld>
             <a:endParaRPr lang="en-US" dirty="0"/>
           </a:p>
@@ -1122,7 +1122,7 @@
             <a:fld id="{5586B75A-687E-405C-8A0B-8D00578BA2C3}" type="datetimeFigureOut">
               <a:rPr lang="en-US" dirty="0"/>
               <a:pPr/>
-              <a:t>6/24/2021</a:t>
+              <a:t>6/28/2021</a:t>
             </a:fld>
             <a:endParaRPr lang="en-US" dirty="0"/>
           </a:p>
@@ -1407,7 +1407,7 @@
             <a:fld id="{5586B75A-687E-405C-8A0B-8D00578BA2C3}" type="datetimeFigureOut">
               <a:rPr lang="en-US" dirty="0"/>
               <a:pPr/>
-              <a:t>6/24/2021</a:t>
+              <a:t>6/28/2021</a:t>
             </a:fld>
             <a:endParaRPr lang="en-US" dirty="0"/>
           </a:p>
@@ -1846,7 +1846,7 @@
             <a:fld id="{5586B75A-687E-405C-8A0B-8D00578BA2C3}" type="datetimeFigureOut">
               <a:rPr lang="en-US" dirty="0"/>
               <a:pPr/>
-              <a:t>6/24/2021</a:t>
+              <a:t>6/28/2021</a:t>
             </a:fld>
             <a:endParaRPr lang="en-US" dirty="0"/>
           </a:p>
@@ -1961,7 +1961,7 @@
             <a:fld id="{5586B75A-687E-405C-8A0B-8D00578BA2C3}" type="datetimeFigureOut">
               <a:rPr lang="en-US" dirty="0"/>
               <a:pPr/>
-              <a:t>6/24/2021</a:t>
+              <a:t>6/28/2021</a:t>
             </a:fld>
             <a:endParaRPr lang="en-US" dirty="0"/>
           </a:p>
@@ -2053,7 +2053,7 @@
             <a:fld id="{5586B75A-687E-405C-8A0B-8D00578BA2C3}" type="datetimeFigureOut">
               <a:rPr lang="en-US" dirty="0"/>
               <a:pPr/>
-              <a:t>6/24/2021</a:t>
+              <a:t>6/28/2021</a:t>
             </a:fld>
             <a:endParaRPr lang="en-US" dirty="0"/>
           </a:p>
@@ -2338,7 +2338,7 @@
             <a:fld id="{5586B75A-687E-405C-8A0B-8D00578BA2C3}" type="datetimeFigureOut">
               <a:rPr lang="en-US" dirty="0"/>
               <a:pPr/>
-              <a:t>6/24/2021</a:t>
+              <a:t>6/28/2021</a:t>
             </a:fld>
             <a:endParaRPr lang="en-US" dirty="0"/>
           </a:p>
@@ -2608,7 +2608,7 @@
             <a:fld id="{5586B75A-687E-405C-8A0B-8D00578BA2C3}" type="datetimeFigureOut">
               <a:rPr lang="en-US" dirty="0"/>
               <a:pPr/>
-              <a:t>6/24/2021</a:t>
+              <a:t>6/28/2021</a:t>
             </a:fld>
             <a:endParaRPr lang="en-US" dirty="0"/>
           </a:p>
@@ -2902,7 +2902,7 @@
             <a:fld id="{5586B75A-687E-405C-8A0B-8D00578BA2C3}" type="datetimeFigureOut">
               <a:rPr lang="en-US" dirty="0"/>
               <a:pPr/>
-              <a:t>6/24/2021</a:t>
+              <a:t>6/28/2021</a:t>
             </a:fld>
             <a:endParaRPr lang="en-US" dirty="0"/>
           </a:p>
@@ -3773,7 +3773,7 @@
         <p:spPr>
           <a:xfrm>
             <a:off x="4172535" y="5725020"/>
-            <a:ext cx="3212739" cy="246221"/>
+            <a:ext cx="3472425" cy="246221"/>
           </a:xfrm>
           <a:prstGeom prst="rect">
             <a:avLst/>
@@ -3792,7 +3792,15 @@
             </a:r>
             <a:r>
               <a:rPr lang="de-DE" sz="1000" dirty="0" smtClean="0"/>
-              <a:t>: LFP-Daten innerhalb eines Patientenordners </a:t>
+              <a:t>: LFP-Daten innerhalb eines Patient*</a:t>
+            </a:r>
+            <a:r>
+              <a:rPr lang="de-DE" sz="1000" dirty="0" err="1" smtClean="0"/>
+              <a:t>innenordners</a:t>
+            </a:r>
+            <a:r>
+              <a:rPr lang="de-DE" sz="1000" dirty="0" smtClean="0"/>
+              <a:t> </a:t>
             </a:r>
             <a:endParaRPr lang="de-DE" sz="1000" dirty="0"/>
           </a:p>
@@ -4391,8 +4399,13 @@
             <a:pPr lvl="2"/>
             <a:r>
               <a:rPr lang="de-DE" dirty="0" smtClean="0"/>
-              <a:t>Aperiodische 1/f-Komponente</a:t>
-            </a:r>
+              <a:t>Aperiodische </a:t>
+            </a:r>
+            <a:r>
+              <a:rPr lang="de-DE" dirty="0" smtClean="0"/>
+              <a:t>(1/f-)Komponente</a:t>
+            </a:r>
+            <a:endParaRPr lang="de-DE" dirty="0" smtClean="0"/>
           </a:p>
           <a:p>
             <a:pPr lvl="2"/>
@@ -6767,7 +6780,7 @@
         <p:spPr>
           <a:xfrm>
             <a:off x="4172535" y="5725020"/>
-            <a:ext cx="3353803" cy="246221"/>
+            <a:ext cx="2821606" cy="246221"/>
           </a:xfrm>
           <a:prstGeom prst="rect">
             <a:avLst/>
@@ -6786,7 +6799,11 @@
             </a:r>
             <a:r>
               <a:rPr lang="de-DE" sz="1000" dirty="0" smtClean="0"/>
-              <a:t>: Vernetzung der Kerne im Basalgangliensystem</a:t>
+              <a:t>: </a:t>
+            </a:r>
+            <a:r>
+              <a:rPr lang="de-DE" sz="1000" dirty="0" smtClean="0"/>
+              <a:t>Direktionale Multi-Kontakt Elektrode </a:t>
             </a:r>
             <a:endParaRPr lang="de-DE" sz="1000" dirty="0"/>
           </a:p>

</xml_diff>